<commit_message>
check in unfinished code for future development.
git-svn-id: https://cbilsvn.pmacs.upenn.edu/svn/gus/WDK/branches/param@13191 4235af6a-31f9-0310-9ad3-ecf6348f2534
</commit_message>
<xml_diff>
--- a/doc/wdk params design.pptx
+++ b/doc/wdk params design.pptx
@@ -303,7 +303,7 @@
           <a:p>
             <a:fld id="{17179AA0-CF20-4A69-81A6-78E2664483D1}" type="datetimeFigureOut">
               <a:rPr lang="en-US" smtClean="0"/>
-              <a:t>10/29/2013</a:t>
+              <a:t>11/1/2013</a:t>
             </a:fld>
             <a:endParaRPr lang="en-US"/>
           </a:p>
@@ -468,7 +468,7 @@
           <a:p>
             <a:fld id="{17179AA0-CF20-4A69-81A6-78E2664483D1}" type="datetimeFigureOut">
               <a:rPr lang="en-US" smtClean="0"/>
-              <a:t>10/29/2013</a:t>
+              <a:t>11/1/2013</a:t>
             </a:fld>
             <a:endParaRPr lang="en-US"/>
           </a:p>
@@ -643,7 +643,7 @@
           <a:p>
             <a:fld id="{17179AA0-CF20-4A69-81A6-78E2664483D1}" type="datetimeFigureOut">
               <a:rPr lang="en-US" smtClean="0"/>
-              <a:t>10/29/2013</a:t>
+              <a:t>11/1/2013</a:t>
             </a:fld>
             <a:endParaRPr lang="en-US"/>
           </a:p>
@@ -826,7 +826,7 @@
           <a:p>
             <a:fld id="{17179AA0-CF20-4A69-81A6-78E2664483D1}" type="datetimeFigureOut">
               <a:rPr lang="en-US" smtClean="0"/>
-              <a:t>10/29/2013</a:t>
+              <a:t>11/1/2013</a:t>
             </a:fld>
             <a:endParaRPr lang="en-US"/>
           </a:p>
@@ -1088,7 +1088,7 @@
           <a:p>
             <a:fld id="{17179AA0-CF20-4A69-81A6-78E2664483D1}" type="datetimeFigureOut">
               <a:rPr lang="en-US" smtClean="0"/>
-              <a:t>10/29/2013</a:t>
+              <a:t>11/1/2013</a:t>
             </a:fld>
             <a:endParaRPr lang="en-US"/>
           </a:p>
@@ -1436,7 +1436,7 @@
           <a:p>
             <a:fld id="{17179AA0-CF20-4A69-81A6-78E2664483D1}" type="datetimeFigureOut">
               <a:rPr lang="en-US" smtClean="0"/>
-              <a:t>10/29/2013</a:t>
+              <a:t>11/1/2013</a:t>
             </a:fld>
             <a:endParaRPr lang="en-US"/>
           </a:p>
@@ -1744,7 +1744,7 @@
           <a:p>
             <a:fld id="{17179AA0-CF20-4A69-81A6-78E2664483D1}" type="datetimeFigureOut">
               <a:rPr lang="en-US" smtClean="0"/>
-              <a:t>10/29/2013</a:t>
+              <a:t>11/1/2013</a:t>
             </a:fld>
             <a:endParaRPr lang="en-US"/>
           </a:p>
@@ -1971,7 +1971,7 @@
           <a:p>
             <a:fld id="{17179AA0-CF20-4A69-81A6-78E2664483D1}" type="datetimeFigureOut">
               <a:rPr lang="en-US" smtClean="0"/>
-              <a:t>10/29/2013</a:t>
+              <a:t>11/1/2013</a:t>
             </a:fld>
             <a:endParaRPr lang="en-US"/>
           </a:p>
@@ -2061,7 +2061,7 @@
           <a:p>
             <a:fld id="{17179AA0-CF20-4A69-81A6-78E2664483D1}" type="datetimeFigureOut">
               <a:rPr lang="en-US" smtClean="0"/>
-              <a:t>10/29/2013</a:t>
+              <a:t>11/1/2013</a:t>
             </a:fld>
             <a:endParaRPr lang="en-US"/>
           </a:p>
@@ -2349,7 +2349,7 @@
           <a:p>
             <a:fld id="{17179AA0-CF20-4A69-81A6-78E2664483D1}" type="datetimeFigureOut">
               <a:rPr lang="en-US" smtClean="0"/>
-              <a:t>10/29/2013</a:t>
+              <a:t>11/1/2013</a:t>
             </a:fld>
             <a:endParaRPr lang="en-US"/>
           </a:p>
@@ -2618,7 +2618,7 @@
           <a:p>
             <a:fld id="{17179AA0-CF20-4A69-81A6-78E2664483D1}" type="datetimeFigureOut">
               <a:rPr lang="en-US" smtClean="0"/>
-              <a:t>10/29/2013</a:t>
+              <a:t>11/1/2013</a:t>
             </a:fld>
             <a:endParaRPr lang="en-US"/>
           </a:p>
@@ -2828,7 +2828,7 @@
           <a:p>
             <a:fld id="{17179AA0-CF20-4A69-81A6-78E2664483D1}" type="datetimeFigureOut">
               <a:rPr lang="en-US" smtClean="0"/>
-              <a:t>10/29/2013</a:t>
+              <a:t>11/1/2013</a:t>
             </a:fld>
             <a:endParaRPr lang="en-US"/>
           </a:p>
@@ -6704,7 +6704,7 @@
         <p:spPr>
           <a:xfrm>
             <a:off x="1066798" y="3216158"/>
-            <a:ext cx="1336200" cy="276999"/>
+            <a:ext cx="1402948" cy="276999"/>
           </a:xfrm>
           <a:prstGeom prst="rect">
             <a:avLst/>
@@ -6735,15 +6735,7 @@
                   <a:srgbClr val="0000CC"/>
                 </a:solidFill>
               </a:rPr>
-              <a:t>+version</a:t>
-            </a:r>
-            <a:r>
-              <a:rPr lang="en-US" sz="1200" dirty="0" smtClean="0">
-                <a:solidFill>
-                  <a:srgbClr val="0000CC"/>
-                </a:solidFill>
-              </a:rPr>
-              <a:t> #</a:t>
+              <a:t>+checksum</a:t>
             </a:r>
             <a:endParaRPr lang="en-US" sz="1200" dirty="0">
               <a:solidFill>
@@ -6792,7 +6784,7 @@
         <p:spPr>
           <a:xfrm>
             <a:off x="1066799" y="3687259"/>
-            <a:ext cx="1336200" cy="276999"/>
+            <a:ext cx="1402948" cy="276999"/>
           </a:xfrm>
           <a:prstGeom prst="rect">
             <a:avLst/>
@@ -6823,15 +6815,7 @@
                   <a:srgbClr val="0000CC"/>
                 </a:solidFill>
               </a:rPr>
-              <a:t>+version</a:t>
-            </a:r>
-            <a:r>
-              <a:rPr lang="en-US" sz="1200" dirty="0" smtClean="0">
-                <a:solidFill>
-                  <a:srgbClr val="0000CC"/>
-                </a:solidFill>
-              </a:rPr>
-              <a:t> #</a:t>
+              <a:t>+checksum</a:t>
             </a:r>
             <a:endParaRPr lang="en-US" sz="1200" dirty="0">
               <a:solidFill>
@@ -7287,7 +7271,7 @@
         <p:spPr>
           <a:xfrm>
             <a:off x="6019801" y="3687255"/>
-            <a:ext cx="1598515" cy="276999"/>
+            <a:ext cx="1258678" cy="276999"/>
           </a:xfrm>
           <a:prstGeom prst="rect">
             <a:avLst/>
@@ -7302,7 +7286,7 @@
           <a:p>
             <a:r>
               <a:rPr lang="en-US" sz="1200" dirty="0" err="1" smtClean="0"/>
-              <a:t>user_dataset_id:type</a:t>
+              <a:t>user_dataset_id</a:t>
             </a:r>
             <a:endParaRPr lang="en-US" sz="1200" dirty="0"/>
           </a:p>
@@ -8072,7 +8056,7 @@
         <p:spPr>
           <a:xfrm>
             <a:off x="204803" y="1145509"/>
-            <a:ext cx="2012089" cy="646331"/>
+            <a:ext cx="3233578" cy="646331"/>
           </a:xfrm>
           <a:prstGeom prst="rect">
             <a:avLst/>
@@ -8107,7 +8091,15 @@
           <a:p>
             <a:r>
               <a:rPr lang="en-US" sz="1200" dirty="0" smtClean="0"/>
-              <a:t>Step3:  {left:#1:2, right:#2:1}</a:t>
+              <a:t>Step3:  {left:#1:{exon:6}, right:#2:{</a:t>
+            </a:r>
+            <a:r>
+              <a:rPr lang="en-US" sz="1200" dirty="0" err="1" smtClean="0"/>
+              <a:t>text:kinase</a:t>
+            </a:r>
+            <a:r>
+              <a:rPr lang="en-US" sz="1200" dirty="0" smtClean="0"/>
+              <a:t>}}</a:t>
             </a:r>
             <a:endParaRPr lang="en-US" sz="1200" dirty="0"/>
           </a:p>
@@ -8256,23 +8248,7 @@
                   <a:srgbClr val="0000CC"/>
                 </a:solidFill>
               </a:rPr>
-              <a:t>s</a:t>
-            </a:r>
-            <a:r>
-              <a:rPr lang="en-US" sz="1200" dirty="0" smtClean="0">
-                <a:solidFill>
-                  <a:srgbClr val="0000CC"/>
-                </a:solidFill>
-              </a:rPr>
-              <a:t>orted term </a:t>
-            </a:r>
-            <a:r>
-              <a:rPr lang="en-US" sz="1200" dirty="0" smtClean="0">
-                <a:solidFill>
-                  <a:srgbClr val="0000CC"/>
-                </a:solidFill>
-              </a:rPr>
-              <a:t>list</a:t>
+              <a:t>sorted term list</a:t>
             </a:r>
             <a:endParaRPr lang="en-US" sz="1200" dirty="0">
               <a:solidFill>
@@ -8305,10 +8281,14 @@
           <a:lstStyle/>
           <a:p>
             <a:r>
-              <a:rPr lang="en-US" sz="1200" dirty="0" err="1" smtClean="0"/>
-              <a:t>dataset_id</a:t>
-            </a:r>
-            <a:endParaRPr lang="en-US" sz="1200" dirty="0"/>
+              <a:rPr lang="en-US" sz="1200"/>
+              <a:t>d</a:t>
+            </a:r>
+            <a:r>
+              <a:rPr lang="en-US" sz="1200" smtClean="0"/>
+              <a:t>ataset_id</a:t>
+            </a:r>
+            <a:endParaRPr lang="en-US" sz="1200" dirty="0" smtClean="0"/>
           </a:p>
         </p:txBody>
       </p:sp>
@@ -8452,17 +8432,8 @@
               <a:rPr lang="en-US" dirty="0" smtClean="0">
                 <a:sym typeface="Wingdings" panose="05000000000000000000" pitchFamily="2" charset="2"/>
               </a:rPr>
-              <a:t> </a:t>
-            </a:r>
-            <a:r>
-              <a:rPr lang="en-US" dirty="0" smtClean="0">
-                <a:sym typeface="Wingdings" panose="05000000000000000000" pitchFamily="2" charset="2"/>
-              </a:rPr>
-              <a:t>Stable</a:t>
-            </a:r>
-            <a:endParaRPr lang="en-US" dirty="0" smtClean="0">
-              <a:sym typeface="Wingdings" panose="05000000000000000000" pitchFamily="2" charset="2"/>
-            </a:endParaRPr>
+              <a:t> Stable</a:t>
+            </a:r>
           </a:p>
           <a:p>
             <a:pPr lvl="2"/>
@@ -8508,9 +8479,6 @@
               </a:rPr>
               <a:t> Signature</a:t>
             </a:r>
-            <a:endParaRPr lang="en-US" dirty="0" smtClean="0">
-              <a:sym typeface="Wingdings" panose="05000000000000000000" pitchFamily="2" charset="2"/>
-            </a:endParaRPr>
           </a:p>
           <a:p>
             <a:pPr lvl="2"/>

</xml_diff>

<commit_message>
fix wdkCache on dropping single query or instance. stable value for abstract enum param doesn't need to sorted,but signature will be sorted.
git-svn-id: https://cbilsvn.pmacs.upenn.edu/svn/gus/WDK/branches/param@13419 4235af6a-31f9-0310-9ad3-ecf6348f2534
</commit_message>
<xml_diff>
--- a/doc/wdk params design.pptx
+++ b/doc/wdk params design.pptx
@@ -303,7 +303,7 @@
           <a:p>
             <a:fld id="{17179AA0-CF20-4A69-81A6-78E2664483D1}" type="datetimeFigureOut">
               <a:rPr lang="en-US" smtClean="0"/>
-              <a:t>1/17/2014</a:t>
+              <a:t>2/12/2014</a:t>
             </a:fld>
             <a:endParaRPr lang="en-US"/>
           </a:p>
@@ -468,7 +468,7 @@
           <a:p>
             <a:fld id="{17179AA0-CF20-4A69-81A6-78E2664483D1}" type="datetimeFigureOut">
               <a:rPr lang="en-US" smtClean="0"/>
-              <a:t>1/17/2014</a:t>
+              <a:t>2/12/2014</a:t>
             </a:fld>
             <a:endParaRPr lang="en-US"/>
           </a:p>
@@ -643,7 +643,7 @@
           <a:p>
             <a:fld id="{17179AA0-CF20-4A69-81A6-78E2664483D1}" type="datetimeFigureOut">
               <a:rPr lang="en-US" smtClean="0"/>
-              <a:t>1/17/2014</a:t>
+              <a:t>2/12/2014</a:t>
             </a:fld>
             <a:endParaRPr lang="en-US"/>
           </a:p>
@@ -826,7 +826,7 @@
           <a:p>
             <a:fld id="{17179AA0-CF20-4A69-81A6-78E2664483D1}" type="datetimeFigureOut">
               <a:rPr lang="en-US" smtClean="0"/>
-              <a:t>1/17/2014</a:t>
+              <a:t>2/12/2014</a:t>
             </a:fld>
             <a:endParaRPr lang="en-US"/>
           </a:p>
@@ -1088,7 +1088,7 @@
           <a:p>
             <a:fld id="{17179AA0-CF20-4A69-81A6-78E2664483D1}" type="datetimeFigureOut">
               <a:rPr lang="en-US" smtClean="0"/>
-              <a:t>1/17/2014</a:t>
+              <a:t>2/12/2014</a:t>
             </a:fld>
             <a:endParaRPr lang="en-US"/>
           </a:p>
@@ -1436,7 +1436,7 @@
           <a:p>
             <a:fld id="{17179AA0-CF20-4A69-81A6-78E2664483D1}" type="datetimeFigureOut">
               <a:rPr lang="en-US" smtClean="0"/>
-              <a:t>1/17/2014</a:t>
+              <a:t>2/12/2014</a:t>
             </a:fld>
             <a:endParaRPr lang="en-US"/>
           </a:p>
@@ -1744,7 +1744,7 @@
           <a:p>
             <a:fld id="{17179AA0-CF20-4A69-81A6-78E2664483D1}" type="datetimeFigureOut">
               <a:rPr lang="en-US" smtClean="0"/>
-              <a:t>1/17/2014</a:t>
+              <a:t>2/12/2014</a:t>
             </a:fld>
             <a:endParaRPr lang="en-US"/>
           </a:p>
@@ -1971,7 +1971,7 @@
           <a:p>
             <a:fld id="{17179AA0-CF20-4A69-81A6-78E2664483D1}" type="datetimeFigureOut">
               <a:rPr lang="en-US" smtClean="0"/>
-              <a:t>1/17/2014</a:t>
+              <a:t>2/12/2014</a:t>
             </a:fld>
             <a:endParaRPr lang="en-US"/>
           </a:p>
@@ -2061,7 +2061,7 @@
           <a:p>
             <a:fld id="{17179AA0-CF20-4A69-81A6-78E2664483D1}" type="datetimeFigureOut">
               <a:rPr lang="en-US" smtClean="0"/>
-              <a:t>1/17/2014</a:t>
+              <a:t>2/12/2014</a:t>
             </a:fld>
             <a:endParaRPr lang="en-US"/>
           </a:p>
@@ -2349,7 +2349,7 @@
           <a:p>
             <a:fld id="{17179AA0-CF20-4A69-81A6-78E2664483D1}" type="datetimeFigureOut">
               <a:rPr lang="en-US" smtClean="0"/>
-              <a:t>1/17/2014</a:t>
+              <a:t>2/12/2014</a:t>
             </a:fld>
             <a:endParaRPr lang="en-US"/>
           </a:p>
@@ -2618,7 +2618,7 @@
           <a:p>
             <a:fld id="{17179AA0-CF20-4A69-81A6-78E2664483D1}" type="datetimeFigureOut">
               <a:rPr lang="en-US" smtClean="0"/>
-              <a:t>1/17/2014</a:t>
+              <a:t>2/12/2014</a:t>
             </a:fld>
             <a:endParaRPr lang="en-US"/>
           </a:p>
@@ -2828,7 +2828,7 @@
           <a:p>
             <a:fld id="{17179AA0-CF20-4A69-81A6-78E2664483D1}" type="datetimeFigureOut">
               <a:rPr lang="en-US" smtClean="0"/>
-              <a:t>1/17/2014</a:t>
+              <a:t>2/12/2014</a:t>
             </a:fld>
             <a:endParaRPr lang="en-US"/>
           </a:p>
@@ -5033,7 +5033,11 @@
             </a:r>
             <a:r>
               <a:rPr lang="en-US" dirty="0" smtClean="0"/>
-              <a:t> - Current</a:t>
+              <a:t> </a:t>
+            </a:r>
+            <a:r>
+              <a:rPr lang="en-US" dirty="0" smtClean="0"/>
+              <a:t>- Old</a:t>
             </a:r>
             <a:endParaRPr lang="en-US" dirty="0"/>
           </a:p>
@@ -6826,7 +6830,7 @@
         <p:spPr>
           <a:xfrm>
             <a:off x="1066799" y="3687259"/>
-            <a:ext cx="1402948" cy="276999"/>
+            <a:ext cx="644728" cy="276999"/>
           </a:xfrm>
           <a:prstGeom prst="rect">
             <a:avLst/>
@@ -6848,16 +6852,8 @@
               <a:t>tep </a:t>
             </a:r>
             <a:r>
-              <a:rPr lang="en-US" sz="1200" dirty="0" err="1" smtClean="0"/>
+              <a:rPr lang="en-US" sz="1200" dirty="0" smtClean="0"/>
               <a:t>id</a:t>
-            </a:r>
-            <a:r>
-              <a:rPr lang="en-US" sz="1200" dirty="0" err="1" smtClean="0">
-                <a:solidFill>
-                  <a:srgbClr val="0000CC"/>
-                </a:solidFill>
-              </a:rPr>
-              <a:t>+checksum</a:t>
             </a:r>
             <a:endParaRPr lang="en-US" sz="1200" dirty="0">
               <a:solidFill>
@@ -7313,7 +7309,7 @@
         <p:spPr>
           <a:xfrm>
             <a:off x="6019801" y="3687255"/>
-            <a:ext cx="1258678" cy="276999"/>
+            <a:ext cx="888385" cy="276999"/>
           </a:xfrm>
           <a:prstGeom prst="rect">
             <a:avLst/>
@@ -7328,7 +7324,7 @@
           <a:p>
             <a:r>
               <a:rPr lang="en-US" sz="1200" dirty="0" err="1" smtClean="0"/>
-              <a:t>user_dataset_id</a:t>
+              <a:t>dataset_id</a:t>
             </a:r>
             <a:endParaRPr lang="en-US" sz="1200" dirty="0"/>
           </a:p>
@@ -8309,7 +8305,7 @@
         <p:spPr>
           <a:xfrm>
             <a:off x="6019801" y="4136935"/>
-            <a:ext cx="888385" cy="276999"/>
+            <a:ext cx="1449436" cy="276999"/>
           </a:xfrm>
           <a:prstGeom prst="rect">
             <a:avLst/>
@@ -8323,12 +8319,8 @@
           <a:lstStyle/>
           <a:p>
             <a:r>
-              <a:rPr lang="en-US" sz="1200"/>
-              <a:t>d</a:t>
-            </a:r>
-            <a:r>
               <a:rPr lang="en-US" sz="1200" smtClean="0"/>
-              <a:t>ataset_id</a:t>
+              <a:t>Content checksum</a:t>
             </a:r>
             <a:endParaRPr lang="en-US" sz="1200" dirty="0" smtClean="0"/>
           </a:p>

</xml_diff>

<commit_message>
make sure the getvalue from array always return a string representation of array, which is the correct form for stable value.
git-svn-id: https://cbilsvn.pmacs.upenn.edu/svn/gus/WDK/branches/param@13421 4235af6a-31f9-0310-9ad3-ecf6348f2534
</commit_message>
<xml_diff>
--- a/doc/wdk params design.pptx
+++ b/doc/wdk params design.pptx
@@ -303,7 +303,7 @@
           <a:p>
             <a:fld id="{17179AA0-CF20-4A69-81A6-78E2664483D1}" type="datetimeFigureOut">
               <a:rPr lang="en-US" smtClean="0"/>
-              <a:t>2/12/2014</a:t>
+              <a:t>2/14/2014</a:t>
             </a:fld>
             <a:endParaRPr lang="en-US"/>
           </a:p>
@@ -468,7 +468,7 @@
           <a:p>
             <a:fld id="{17179AA0-CF20-4A69-81A6-78E2664483D1}" type="datetimeFigureOut">
               <a:rPr lang="en-US" smtClean="0"/>
-              <a:t>2/12/2014</a:t>
+              <a:t>2/14/2014</a:t>
             </a:fld>
             <a:endParaRPr lang="en-US"/>
           </a:p>
@@ -643,7 +643,7 @@
           <a:p>
             <a:fld id="{17179AA0-CF20-4A69-81A6-78E2664483D1}" type="datetimeFigureOut">
               <a:rPr lang="en-US" smtClean="0"/>
-              <a:t>2/12/2014</a:t>
+              <a:t>2/14/2014</a:t>
             </a:fld>
             <a:endParaRPr lang="en-US"/>
           </a:p>
@@ -826,7 +826,7 @@
           <a:p>
             <a:fld id="{17179AA0-CF20-4A69-81A6-78E2664483D1}" type="datetimeFigureOut">
               <a:rPr lang="en-US" smtClean="0"/>
-              <a:t>2/12/2014</a:t>
+              <a:t>2/14/2014</a:t>
             </a:fld>
             <a:endParaRPr lang="en-US"/>
           </a:p>
@@ -1088,7 +1088,7 @@
           <a:p>
             <a:fld id="{17179AA0-CF20-4A69-81A6-78E2664483D1}" type="datetimeFigureOut">
               <a:rPr lang="en-US" smtClean="0"/>
-              <a:t>2/12/2014</a:t>
+              <a:t>2/14/2014</a:t>
             </a:fld>
             <a:endParaRPr lang="en-US"/>
           </a:p>
@@ -1436,7 +1436,7 @@
           <a:p>
             <a:fld id="{17179AA0-CF20-4A69-81A6-78E2664483D1}" type="datetimeFigureOut">
               <a:rPr lang="en-US" smtClean="0"/>
-              <a:t>2/12/2014</a:t>
+              <a:t>2/14/2014</a:t>
             </a:fld>
             <a:endParaRPr lang="en-US"/>
           </a:p>
@@ -1744,7 +1744,7 @@
           <a:p>
             <a:fld id="{17179AA0-CF20-4A69-81A6-78E2664483D1}" type="datetimeFigureOut">
               <a:rPr lang="en-US" smtClean="0"/>
-              <a:t>2/12/2014</a:t>
+              <a:t>2/14/2014</a:t>
             </a:fld>
             <a:endParaRPr lang="en-US"/>
           </a:p>
@@ -1971,7 +1971,7 @@
           <a:p>
             <a:fld id="{17179AA0-CF20-4A69-81A6-78E2664483D1}" type="datetimeFigureOut">
               <a:rPr lang="en-US" smtClean="0"/>
-              <a:t>2/12/2014</a:t>
+              <a:t>2/14/2014</a:t>
             </a:fld>
             <a:endParaRPr lang="en-US"/>
           </a:p>
@@ -2061,7 +2061,7 @@
           <a:p>
             <a:fld id="{17179AA0-CF20-4A69-81A6-78E2664483D1}" type="datetimeFigureOut">
               <a:rPr lang="en-US" smtClean="0"/>
-              <a:t>2/12/2014</a:t>
+              <a:t>2/14/2014</a:t>
             </a:fld>
             <a:endParaRPr lang="en-US"/>
           </a:p>
@@ -2349,7 +2349,7 @@
           <a:p>
             <a:fld id="{17179AA0-CF20-4A69-81A6-78E2664483D1}" type="datetimeFigureOut">
               <a:rPr lang="en-US" smtClean="0"/>
-              <a:t>2/12/2014</a:t>
+              <a:t>2/14/2014</a:t>
             </a:fld>
             <a:endParaRPr lang="en-US"/>
           </a:p>
@@ -2618,7 +2618,7 @@
           <a:p>
             <a:fld id="{17179AA0-CF20-4A69-81A6-78E2664483D1}" type="datetimeFigureOut">
               <a:rPr lang="en-US" smtClean="0"/>
-              <a:t>2/12/2014</a:t>
+              <a:t>2/14/2014</a:t>
             </a:fld>
             <a:endParaRPr lang="en-US"/>
           </a:p>
@@ -2828,7 +2828,7 @@
           <a:p>
             <a:fld id="{17179AA0-CF20-4A69-81A6-78E2664483D1}" type="datetimeFigureOut">
               <a:rPr lang="en-US" smtClean="0"/>
-              <a:t>2/12/2014</a:t>
+              <a:t>2/14/2014</a:t>
             </a:fld>
             <a:endParaRPr lang="en-US"/>
           </a:p>
@@ -5033,11 +5033,7 @@
             </a:r>
             <a:r>
               <a:rPr lang="en-US" dirty="0" smtClean="0"/>
-              <a:t> </a:t>
-            </a:r>
-            <a:r>
-              <a:rPr lang="en-US" dirty="0" smtClean="0"/>
-              <a:t>- Old</a:t>
+              <a:t> - Old</a:t>
             </a:r>
             <a:endParaRPr lang="en-US" dirty="0"/>
           </a:p>
@@ -6849,11 +6845,7 @@
             </a:r>
             <a:r>
               <a:rPr lang="en-US" sz="1200" dirty="0" smtClean="0"/>
-              <a:t>tep </a:t>
-            </a:r>
-            <a:r>
-              <a:rPr lang="en-US" sz="1200" dirty="0" smtClean="0"/>
-              <a:t>id</a:t>
+              <a:t>tep id</a:t>
             </a:r>
             <a:endParaRPr lang="en-US" sz="1200" dirty="0">
               <a:solidFill>
@@ -7780,14 +7772,14 @@
       </p:sp>
       <p:sp>
         <p:nvSpPr>
-          <p:cNvPr id="82" name="Rounded Rectangle 81"/>
+          <p:cNvPr id="85" name="Rounded Rectangle 84"/>
           <p:cNvSpPr/>
           <p:nvPr/>
         </p:nvSpPr>
         <p:spPr>
           <a:xfrm>
-            <a:off x="5844907" y="5552340"/>
-            <a:ext cx="1288570" cy="340112"/>
+            <a:off x="5857864" y="6426230"/>
+            <a:ext cx="1310573" cy="340112"/>
           </a:xfrm>
           <a:prstGeom prst="roundRect">
             <a:avLst/>
@@ -7848,7 +7840,7 @@
                   <a:schemeClr val="tx1"/>
                 </a:solidFill>
               </a:rPr>
-              <a:t>dataset_indices</a:t>
+              <a:t>dataset_values</a:t>
             </a:r>
             <a:endParaRPr lang="en-US" sz="1200" dirty="0" smtClean="0">
               <a:solidFill>
@@ -7858,16 +7850,54 @@
           </a:p>
         </p:txBody>
       </p:sp>
-      <p:sp>
-        <p:nvSpPr>
-          <p:cNvPr id="85" name="Rounded Rectangle 84"/>
+      <p:cxnSp>
+        <p:nvCxnSpPr>
+          <p:cNvPr id="93" name="Elbow Connector 92"/>
+          <p:cNvCxnSpPr>
+            <a:stCxn id="70" idx="3"/>
+            <a:endCxn id="85" idx="3"/>
+          </p:cNvCxnSpPr>
+          <p:nvPr/>
+        </p:nvCxnSpPr>
+        <p:spPr>
+          <a:xfrm>
+            <a:off x="7141050" y="6096000"/>
+            <a:ext cx="27387" cy="500286"/>
+          </a:xfrm>
+          <a:prstGeom prst="bentConnector3">
+            <a:avLst>
+              <a:gd name="adj1" fmla="val 934703"/>
+            </a:avLst>
+          </a:prstGeom>
+          <a:ln>
+            <a:tailEnd type="arrow"/>
+          </a:ln>
+        </p:spPr>
+        <p:style>
+          <a:lnRef idx="1">
+            <a:schemeClr val="accent1"/>
+          </a:lnRef>
+          <a:fillRef idx="0">
+            <a:schemeClr val="accent1"/>
+          </a:fillRef>
+          <a:effectRef idx="0">
+            <a:schemeClr val="accent1"/>
+          </a:effectRef>
+          <a:fontRef idx="minor">
+            <a:schemeClr val="tx1"/>
+          </a:fontRef>
+        </p:style>
+      </p:cxnSp>
+      <p:sp>
+        <p:nvSpPr>
+          <p:cNvPr id="70" name="Rounded Rectangle 69"/>
           <p:cNvSpPr/>
           <p:nvPr/>
         </p:nvSpPr>
         <p:spPr>
           <a:xfrm>
-            <a:off x="6814399" y="6154544"/>
-            <a:ext cx="1310573" cy="340112"/>
+            <a:off x="5857864" y="5925944"/>
+            <a:ext cx="1283186" cy="340112"/>
           </a:xfrm>
           <a:prstGeom prst="roundRect">
             <a:avLst/>
@@ -7923,12 +7953,12 @@
           <a:p>
             <a:pPr algn="ctr"/>
             <a:r>
-              <a:rPr lang="en-US" sz="1200" dirty="0" err="1" smtClean="0">
+              <a:rPr lang="en-US" sz="1200" dirty="0" smtClean="0">
                 <a:solidFill>
                   <a:schemeClr val="tx1"/>
                 </a:solidFill>
               </a:rPr>
-              <a:t>dataset_values</a:t>
+              <a:t>datasets</a:t>
             </a:r>
             <a:endParaRPr lang="en-US" sz="1200" dirty="0" smtClean="0">
               <a:solidFill>
@@ -7938,153 +7968,6 @@
           </a:p>
         </p:txBody>
       </p:sp>
-      <p:cxnSp>
-        <p:nvCxnSpPr>
-          <p:cNvPr id="93" name="Elbow Connector 92"/>
-          <p:cNvCxnSpPr>
-            <a:stCxn id="82" idx="3"/>
-            <a:endCxn id="85" idx="0"/>
-          </p:cNvCxnSpPr>
-          <p:nvPr/>
-        </p:nvCxnSpPr>
-        <p:spPr>
-          <a:xfrm>
-            <a:off x="7133477" y="5722396"/>
-            <a:ext cx="336209" cy="432148"/>
-          </a:xfrm>
-          <a:prstGeom prst="bentConnector2">
-            <a:avLst/>
-          </a:prstGeom>
-          <a:ln>
-            <a:tailEnd type="arrow"/>
-          </a:ln>
-        </p:spPr>
-        <p:style>
-          <a:lnRef idx="1">
-            <a:schemeClr val="accent1"/>
-          </a:lnRef>
-          <a:fillRef idx="0">
-            <a:schemeClr val="accent1"/>
-          </a:fillRef>
-          <a:effectRef idx="0">
-            <a:schemeClr val="accent1"/>
-          </a:effectRef>
-          <a:fontRef idx="minor">
-            <a:schemeClr val="tx1"/>
-          </a:fontRef>
-        </p:style>
-      </p:cxnSp>
-      <p:sp>
-        <p:nvSpPr>
-          <p:cNvPr id="70" name="Rounded Rectangle 69"/>
-          <p:cNvSpPr/>
-          <p:nvPr/>
-        </p:nvSpPr>
-        <p:spPr>
-          <a:xfrm>
-            <a:off x="5850291" y="6426230"/>
-            <a:ext cx="1283186" cy="340112"/>
-          </a:xfrm>
-          <a:prstGeom prst="roundRect">
-            <a:avLst/>
-          </a:prstGeom>
-          <a:solidFill>
-            <a:schemeClr val="accent3">
-              <a:lumMod val="40000"/>
-              <a:lumOff val="60000"/>
-            </a:schemeClr>
-          </a:solidFill>
-          <a:ln>
-            <a:noFill/>
-          </a:ln>
-          <a:effectLst>
-            <a:glow rad="63500">
-              <a:schemeClr val="accent3">
-                <a:satMod val="175000"/>
-                <a:alpha val="40000"/>
-              </a:schemeClr>
-            </a:glow>
-            <a:outerShdw blurRad="50800" dist="38100" dir="2700000" algn="tl" rotWithShape="0">
-              <a:prstClr val="black">
-                <a:alpha val="40000"/>
-              </a:prstClr>
-            </a:outerShdw>
-            <a:reflection blurRad="6350" stA="52000" endA="300" endPos="35000" dir="5400000" sy="-100000" algn="bl" rotWithShape="0"/>
-          </a:effectLst>
-        </p:spPr>
-        <p:style>
-          <a:lnRef idx="2">
-            <a:schemeClr val="accent1">
-              <a:shade val="50000"/>
-            </a:schemeClr>
-          </a:lnRef>
-          <a:fillRef idx="1">
-            <a:schemeClr val="accent1"/>
-          </a:fillRef>
-          <a:effectRef idx="0">
-            <a:schemeClr val="accent1"/>
-          </a:effectRef>
-          <a:fontRef idx="minor">
-            <a:schemeClr val="lt1"/>
-          </a:fontRef>
-        </p:style>
-        <p:txBody>
-          <a:bodyPr rot="0" spcFirstLastPara="0" vertOverflow="overflow" horzOverflow="overflow" vert="horz" wrap="square" lIns="91440" tIns="45720" rIns="91440" bIns="45720" numCol="1" spcCol="0" rtlCol="0" fromWordArt="0" anchor="ctr" anchorCtr="0" forceAA="0" compatLnSpc="1">
-            <a:prstTxWarp prst="textNoShape">
-              <a:avLst/>
-            </a:prstTxWarp>
-            <a:noAutofit/>
-          </a:bodyPr>
-          <a:lstStyle/>
-          <a:p>
-            <a:pPr algn="ctr"/>
-            <a:r>
-              <a:rPr lang="en-US" sz="1200" dirty="0" smtClean="0">
-                <a:solidFill>
-                  <a:schemeClr val="tx1"/>
-                </a:solidFill>
-              </a:rPr>
-              <a:t>user_datasets2</a:t>
-            </a:r>
-          </a:p>
-        </p:txBody>
-      </p:sp>
-      <p:cxnSp>
-        <p:nvCxnSpPr>
-          <p:cNvPr id="73" name="Straight Arrow Connector 72"/>
-          <p:cNvCxnSpPr>
-            <a:stCxn id="82" idx="2"/>
-            <a:endCxn id="70" idx="0"/>
-          </p:cNvCxnSpPr>
-          <p:nvPr/>
-        </p:nvCxnSpPr>
-        <p:spPr>
-          <a:xfrm>
-            <a:off x="6489192" y="5892452"/>
-            <a:ext cx="2692" cy="533778"/>
-          </a:xfrm>
-          <a:prstGeom prst="straightConnector1">
-            <a:avLst/>
-          </a:prstGeom>
-          <a:ln>
-            <a:tailEnd type="arrow"/>
-          </a:ln>
-        </p:spPr>
-        <p:style>
-          <a:lnRef idx="1">
-            <a:schemeClr val="accent1"/>
-          </a:lnRef>
-          <a:fillRef idx="0">
-            <a:schemeClr val="accent1"/>
-          </a:fillRef>
-          <a:effectRef idx="0">
-            <a:schemeClr val="accent1"/>
-          </a:effectRef>
-          <a:fontRef idx="minor">
-            <a:schemeClr val="tx1"/>
-          </a:fontRef>
-        </p:style>
-      </p:cxnSp>
       <p:sp>
         <p:nvSpPr>
           <p:cNvPr id="17" name="TextBox 16"/>

</xml_diff>

<commit_message>
add the constant back since it's used some other places.
git-svn-id: https://cbilsvn.pmacs.upenn.edu/svn/gus/WDK/branches/param@13432 4235af6a-31f9-0310-9ad3-ecf6348f2534
</commit_message>
<xml_diff>
--- a/doc/wdk params design.pptx
+++ b/doc/wdk params design.pptx
@@ -303,7 +303,7 @@
           <a:p>
             <a:fld id="{17179AA0-CF20-4A69-81A6-78E2664483D1}" type="datetimeFigureOut">
               <a:rPr lang="en-US" smtClean="0"/>
-              <a:t>2/14/2014</a:t>
+              <a:t>2/19/2014</a:t>
             </a:fld>
             <a:endParaRPr lang="en-US"/>
           </a:p>
@@ -468,7 +468,7 @@
           <a:p>
             <a:fld id="{17179AA0-CF20-4A69-81A6-78E2664483D1}" type="datetimeFigureOut">
               <a:rPr lang="en-US" smtClean="0"/>
-              <a:t>2/14/2014</a:t>
+              <a:t>2/19/2014</a:t>
             </a:fld>
             <a:endParaRPr lang="en-US"/>
           </a:p>
@@ -643,7 +643,7 @@
           <a:p>
             <a:fld id="{17179AA0-CF20-4A69-81A6-78E2664483D1}" type="datetimeFigureOut">
               <a:rPr lang="en-US" smtClean="0"/>
-              <a:t>2/14/2014</a:t>
+              <a:t>2/19/2014</a:t>
             </a:fld>
             <a:endParaRPr lang="en-US"/>
           </a:p>
@@ -826,7 +826,7 @@
           <a:p>
             <a:fld id="{17179AA0-CF20-4A69-81A6-78E2664483D1}" type="datetimeFigureOut">
               <a:rPr lang="en-US" smtClean="0"/>
-              <a:t>2/14/2014</a:t>
+              <a:t>2/19/2014</a:t>
             </a:fld>
             <a:endParaRPr lang="en-US"/>
           </a:p>
@@ -1088,7 +1088,7 @@
           <a:p>
             <a:fld id="{17179AA0-CF20-4A69-81A6-78E2664483D1}" type="datetimeFigureOut">
               <a:rPr lang="en-US" smtClean="0"/>
-              <a:t>2/14/2014</a:t>
+              <a:t>2/19/2014</a:t>
             </a:fld>
             <a:endParaRPr lang="en-US"/>
           </a:p>
@@ -1436,7 +1436,7 @@
           <a:p>
             <a:fld id="{17179AA0-CF20-4A69-81A6-78E2664483D1}" type="datetimeFigureOut">
               <a:rPr lang="en-US" smtClean="0"/>
-              <a:t>2/14/2014</a:t>
+              <a:t>2/19/2014</a:t>
             </a:fld>
             <a:endParaRPr lang="en-US"/>
           </a:p>
@@ -1744,7 +1744,7 @@
           <a:p>
             <a:fld id="{17179AA0-CF20-4A69-81A6-78E2664483D1}" type="datetimeFigureOut">
               <a:rPr lang="en-US" smtClean="0"/>
-              <a:t>2/14/2014</a:t>
+              <a:t>2/19/2014</a:t>
             </a:fld>
             <a:endParaRPr lang="en-US"/>
           </a:p>
@@ -1971,7 +1971,7 @@
           <a:p>
             <a:fld id="{17179AA0-CF20-4A69-81A6-78E2664483D1}" type="datetimeFigureOut">
               <a:rPr lang="en-US" smtClean="0"/>
-              <a:t>2/14/2014</a:t>
+              <a:t>2/19/2014</a:t>
             </a:fld>
             <a:endParaRPr lang="en-US"/>
           </a:p>
@@ -2061,7 +2061,7 @@
           <a:p>
             <a:fld id="{17179AA0-CF20-4A69-81A6-78E2664483D1}" type="datetimeFigureOut">
               <a:rPr lang="en-US" smtClean="0"/>
-              <a:t>2/14/2014</a:t>
+              <a:t>2/19/2014</a:t>
             </a:fld>
             <a:endParaRPr lang="en-US"/>
           </a:p>
@@ -2349,7 +2349,7 @@
           <a:p>
             <a:fld id="{17179AA0-CF20-4A69-81A6-78E2664483D1}" type="datetimeFigureOut">
               <a:rPr lang="en-US" smtClean="0"/>
-              <a:t>2/14/2014</a:t>
+              <a:t>2/19/2014</a:t>
             </a:fld>
             <a:endParaRPr lang="en-US"/>
           </a:p>
@@ -2618,7 +2618,7 @@
           <a:p>
             <a:fld id="{17179AA0-CF20-4A69-81A6-78E2664483D1}" type="datetimeFigureOut">
               <a:rPr lang="en-US" smtClean="0"/>
-              <a:t>2/14/2014</a:t>
+              <a:t>2/19/2014</a:t>
             </a:fld>
             <a:endParaRPr lang="en-US"/>
           </a:p>
@@ -2828,7 +2828,7 @@
           <a:p>
             <a:fld id="{17179AA0-CF20-4A69-81A6-78E2664483D1}" type="datetimeFigureOut">
               <a:rPr lang="en-US" smtClean="0"/>
-              <a:t>2/14/2014</a:t>
+              <a:t>2/19/2014</a:t>
             </a:fld>
             <a:endParaRPr lang="en-US"/>
           </a:p>
@@ -5861,6 +5861,13 @@
   <p:clrMapOvr>
     <a:masterClrMapping/>
   </p:clrMapOvr>
+  <p:timing>
+    <p:tnLst>
+      <p:par>
+        <p:cTn id="1" dur="indefinite" restart="never" nodeType="tmRoot"/>
+      </p:par>
+    </p:tnLst>
+  </p:timing>
 </p:sld>
 </file>
 
@@ -6863,8 +6870,8 @@
         </p:nvSpPr>
         <p:spPr>
           <a:xfrm>
-            <a:off x="525079" y="3216157"/>
-            <a:ext cx="457176" cy="276999"/>
+            <a:off x="345542" y="3216157"/>
+            <a:ext cx="636713" cy="276999"/>
           </a:xfrm>
           <a:prstGeom prst="rect">
             <a:avLst/>
@@ -6879,12 +6886,8 @@
           <a:p>
             <a:pPr algn="r"/>
             <a:r>
-              <a:rPr lang="en-US" sz="1200" b="1" i="1" dirty="0"/>
-              <a:t>r</a:t>
-            </a:r>
-            <a:r>
               <a:rPr lang="en-US" sz="1200" b="1" i="1" dirty="0" smtClean="0"/>
-              <a:t>aw</a:t>
+              <a:t>parsed</a:t>
             </a:r>
             <a:endParaRPr lang="en-US" sz="1200" b="1" i="1" dirty="0"/>
           </a:p>
@@ -7345,16 +7348,28 @@
           <a:lstStyle/>
           <a:p>
             <a:r>
-              <a:rPr lang="en-US" sz="1200" dirty="0" smtClean="0"/>
+              <a:rPr lang="en-US" sz="1200" dirty="0" smtClean="0">
+                <a:solidFill>
+                  <a:srgbClr val="0000CC"/>
+                </a:solidFill>
+              </a:rPr>
               <a:t>an SQL to dataset values</a:t>
             </a:r>
           </a:p>
           <a:p>
             <a:r>
-              <a:rPr lang="en-US" sz="1200" i="1" dirty="0" err="1" smtClean="0"/>
-              <a:t>user_dataset_id</a:t>
-            </a:r>
-            <a:endParaRPr lang="en-US" sz="1200" i="1" dirty="0"/>
+              <a:rPr lang="en-US" sz="1200" i="1" dirty="0" err="1" smtClean="0">
+                <a:solidFill>
+                  <a:srgbClr val="0000CC"/>
+                </a:solidFill>
+              </a:rPr>
+              <a:t>dataset_id</a:t>
+            </a:r>
+            <a:endParaRPr lang="en-US" sz="1200" i="1" dirty="0">
+              <a:solidFill>
+                <a:srgbClr val="0000CC"/>
+              </a:solidFill>
+            </a:endParaRPr>
           </a:p>
         </p:txBody>
       </p:sp>
@@ -7603,7 +7618,7 @@
         </p:nvCxnSpPr>
         <p:spPr>
           <a:xfrm>
-            <a:off x="164480" y="6324600"/>
+            <a:off x="138754" y="5791200"/>
             <a:ext cx="8839200" cy="0"/>
           </a:xfrm>
           <a:prstGeom prst="line">
@@ -7677,8 +7692,8 @@
         </p:nvSpPr>
         <p:spPr>
           <a:xfrm>
-            <a:off x="73360" y="6426230"/>
-            <a:ext cx="917239" cy="276999"/>
+            <a:off x="-6790" y="6426230"/>
+            <a:ext cx="997389" cy="276999"/>
           </a:xfrm>
           <a:prstGeom prst="rect">
             <a:avLst/>
@@ -7694,38 +7709,7 @@
             <a:pPr algn="r"/>
             <a:r>
               <a:rPr lang="en-US" sz="1200" b="1" dirty="0" smtClean="0"/>
-              <a:t>userlogins4</a:t>
-            </a:r>
-            <a:endParaRPr lang="en-US" sz="1200" b="1" dirty="0"/>
-          </a:p>
-        </p:txBody>
-      </p:sp>
-      <p:sp>
-        <p:nvSpPr>
-          <p:cNvPr id="78" name="TextBox 77"/>
-          <p:cNvSpPr txBox="1"/>
-          <p:nvPr/>
-        </p:nvSpPr>
-        <p:spPr>
-          <a:xfrm>
-            <a:off x="97654" y="5819001"/>
-            <a:ext cx="884601" cy="276999"/>
-          </a:xfrm>
-          <a:prstGeom prst="rect">
-            <a:avLst/>
-          </a:prstGeom>
-          <a:noFill/>
-        </p:spPr>
-        <p:txBody>
-          <a:bodyPr wrap="none" rtlCol="0">
-            <a:spAutoFit/>
-          </a:bodyPr>
-          <a:lstStyle/>
-          <a:p>
-            <a:pPr algn="r"/>
-            <a:r>
-              <a:rPr lang="en-US" sz="1200" b="1" dirty="0" err="1" smtClean="0"/>
-              <a:t>wdkengine</a:t>
+              <a:t>userlogins5</a:t>
             </a:r>
             <a:endParaRPr lang="en-US" sz="1200" b="1" dirty="0"/>
           </a:p>
@@ -7861,12 +7845,12 @@
         </p:nvCxnSpPr>
         <p:spPr>
           <a:xfrm>
-            <a:off x="7141050" y="6096000"/>
-            <a:ext cx="27387" cy="500286"/>
+            <a:off x="7119213" y="6073079"/>
+            <a:ext cx="49224" cy="523207"/>
           </a:xfrm>
           <a:prstGeom prst="bentConnector3">
             <a:avLst>
-              <a:gd name="adj1" fmla="val 934703"/>
+              <a:gd name="adj1" fmla="val 564408"/>
             </a:avLst>
           </a:prstGeom>
           <a:ln>
@@ -7896,7 +7880,7 @@
         </p:nvSpPr>
         <p:spPr>
           <a:xfrm>
-            <a:off x="5857864" y="5925944"/>
+            <a:off x="5836027" y="5903023"/>
             <a:ext cx="1283186" cy="340112"/>
           </a:xfrm>
           <a:prstGeom prst="roundRect">
@@ -7960,11 +7944,6 @@
               </a:rPr>
               <a:t>datasets</a:t>
             </a:r>
-            <a:endParaRPr lang="en-US" sz="1200" dirty="0" smtClean="0">
-              <a:solidFill>
-                <a:schemeClr val="tx1"/>
-              </a:solidFill>
-            </a:endParaRPr>
           </a:p>
         </p:txBody>
       </p:sp>
@@ -8202,10 +8181,21 @@
           <a:lstStyle/>
           <a:p>
             <a:r>
-              <a:rPr lang="en-US" sz="1200" smtClean="0"/>
-              <a:t>Content checksum</a:t>
-            </a:r>
-            <a:endParaRPr lang="en-US" sz="1200" dirty="0" smtClean="0"/>
+              <a:rPr lang="en-US" sz="1200" dirty="0" smtClean="0">
+                <a:solidFill>
+                  <a:srgbClr val="0000CC"/>
+                </a:solidFill>
+              </a:rPr>
+              <a:t>content </a:t>
+            </a:r>
+            <a:r>
+              <a:rPr lang="en-US" sz="1200" dirty="0" smtClean="0">
+                <a:solidFill>
+                  <a:srgbClr val="0000CC"/>
+                </a:solidFill>
+              </a:rPr>
+              <a:t>checksum</a:t>
+            </a:r>
           </a:p>
         </p:txBody>
       </p:sp>
@@ -8236,6 +8226,36 @@
               <a:t>timestamp</a:t>
             </a:r>
             <a:endParaRPr lang="en-US" sz="1200" dirty="0"/>
+          </a:p>
+        </p:txBody>
+      </p:sp>
+      <p:sp>
+        <p:nvSpPr>
+          <p:cNvPr id="11" name="TextBox 10"/>
+          <p:cNvSpPr txBox="1"/>
+          <p:nvPr/>
+        </p:nvSpPr>
+        <p:spPr>
+          <a:xfrm>
+            <a:off x="4558354" y="5181600"/>
+            <a:ext cx="1091966" cy="369332"/>
+          </a:xfrm>
+          <a:prstGeom prst="rect">
+            <a:avLst/>
+          </a:prstGeom>
+          <a:noFill/>
+        </p:spPr>
+        <p:txBody>
+          <a:bodyPr wrap="none" rtlCol="0">
+            <a:spAutoFit/>
+          </a:bodyPr>
+          <a:lstStyle/>
+          <a:p>
+            <a:r>
+              <a:rPr lang="en-US" dirty="0" smtClean="0"/>
+              <a:t>SELECT </a:t>
+            </a:r>
+            <a:endParaRPr lang="en-US" dirty="0"/>
           </a:p>
         </p:txBody>
       </p:sp>
@@ -8249,6 +8269,13 @@
   <p:clrMapOvr>
     <a:masterClrMapping/>
   </p:clrMapOvr>
+  <p:timing>
+    <p:tnLst>
+      <p:par>
+        <p:cTn id="1" dur="indefinite" restart="never" nodeType="tmRoot"/>
+      </p:par>
+    </p:tnLst>
+  </p:timing>
 </p:sld>
 </file>
 
@@ -8424,6 +8451,13 @@
   <p:clrMapOvr>
     <a:masterClrMapping/>
   </p:clrMapOvr>
+  <p:timing>
+    <p:tnLst>
+      <p:par>
+        <p:cTn id="1" dur="indefinite" restart="never" nodeType="tmRoot"/>
+      </p:par>
+    </p:tnLst>
+  </p:timing>
 </p:sld>
 </file>
 
@@ -8612,6 +8646,13 @@
   <p:clrMapOvr>
     <a:masterClrMapping/>
   </p:clrMapOvr>
+  <p:timing>
+    <p:tnLst>
+      <p:par>
+        <p:cTn id="1" dur="indefinite" restart="never" nodeType="tmRoot"/>
+      </p:par>
+    </p:tnLst>
+  </p:timing>
 </p:sld>
 </file>
 

</xml_diff>